<commit_message>
[master] updated guides for AY 2023/24
</commit_message>
<xml_diff>
--- a/impact.pptx
+++ b/impact.pptx
@@ -205,7 +205,7 @@
           <a:p>
             <a:fld id="{81C4B3FE-0320-8142-8396-5C3025C019EC}" type="datetimeFigureOut">
               <a:rPr lang="en-IT" smtClean="0"/>
-              <a:t>02/05/23</a:t>
+              <a:t>1/16/24</a:t>
             </a:fld>
             <a:endParaRPr lang="en-IT"/>
           </a:p>
@@ -1862,7 +1862,7 @@
             </a:pPr>
             <a:r>
               <a:rPr lang="it-IT" sz="2800" dirty="0"/>
-              <a:t>A.Y. 2022-2023</a:t>
+              <a:t>A.Y. 2023-2024</a:t>
             </a:r>
           </a:p>
         </p:txBody>
@@ -4568,7 +4568,7 @@
                 <a:effectLst/>
                 <a:latin typeface="Menlo" panose="020B0609030804020204" pitchFamily="49" charset="0"/>
               </a:rPr>
-              <a:t>"2023-09-30"</a:t>
+              <a:t>"2024-09-30"</a:t>
             </a:r>
             <a:endParaRPr lang="en-GB" sz="1400" b="0" dirty="0">
               <a:solidFill>
@@ -8124,7 +8124,7 @@
         <p:spPr>
           <a:xfrm>
             <a:off x="9611394" y="1650775"/>
-            <a:ext cx="1677133" cy="604041"/>
+            <a:ext cx="1921476" cy="604041"/>
           </a:xfrm>
           <a:prstGeom prst="rect">
             <a:avLst/>
@@ -8132,7 +8132,7 @@
         </p:spPr>
         <p:txBody>
           <a:bodyPr vert="horz" lIns="91440" tIns="45720" rIns="91440" bIns="45720" rtlCol="0">
-            <a:normAutofit/>
+            <a:normAutofit fontScale="92500"/>
           </a:bodyPr>
           <a:lstStyle>
             <a:lvl1pPr marL="342900" indent="-342900" algn="l" defTabSz="914400" rtl="0" eaLnBrk="1" latinLnBrk="0" hangingPunct="1">
@@ -8318,8 +8318,16 @@
               <a:buNone/>
             </a:pPr>
             <a:r>
+              <a:rPr lang="en-US" b="1" dirty="0"/>
+              <a:t>Laboratory</a:t>
+            </a:r>
+            <a:r>
+              <a:rPr lang="en-IT" b="1"/>
+              <a:t> </a:t>
+            </a:r>
+            <a:r>
               <a:rPr lang="en-IT" b="1" dirty="0"/>
-              <a:t>Lesson 9</a:t>
+              <a:t>9</a:t>
             </a:r>
           </a:p>
         </p:txBody>
@@ -8341,7 +8349,7 @@
         <p:spPr>
           <a:xfrm>
             <a:off x="598801" y="6054329"/>
-            <a:ext cx="1677133" cy="604041"/>
+            <a:ext cx="2038797" cy="604041"/>
           </a:xfrm>
           <a:prstGeom prst="rect">
             <a:avLst/>
@@ -8349,7 +8357,7 @@
         </p:spPr>
         <p:txBody>
           <a:bodyPr vert="horz" lIns="91440" tIns="45720" rIns="91440" bIns="45720" rtlCol="0">
-            <a:normAutofit/>
+            <a:normAutofit fontScale="92500"/>
           </a:bodyPr>
           <a:lstStyle>
             <a:lvl1pPr marL="342900" indent="-342900" algn="l" defTabSz="914400" rtl="0" eaLnBrk="1" latinLnBrk="0" hangingPunct="1">
@@ -8535,9 +8543,10 @@
               <a:buNone/>
             </a:pPr>
             <a:r>
-              <a:rPr lang="en-IT" b="1" dirty="0"/>
-              <a:t>Lesson 10</a:t>
-            </a:r>
+              <a:rPr lang="en-US" b="1" dirty="0"/>
+              <a:t>Laboratory 10</a:t>
+            </a:r>
+            <a:endParaRPr lang="en-IT" b="1" dirty="0"/>
           </a:p>
         </p:txBody>
       </p:sp>
@@ -8551,14 +8560,15 @@
             </a:extLst>
           </p:cNvPr>
           <p:cNvCxnSpPr>
+            <a:cxnSpLocks/>
             <a:endCxn id="17" idx="0"/>
           </p:cNvCxnSpPr>
           <p:nvPr/>
         </p:nvCxnSpPr>
         <p:spPr>
           <a:xfrm flipH="1">
-            <a:off x="1437368" y="4627027"/>
-            <a:ext cx="1141063" cy="1427302"/>
+            <a:off x="1618200" y="4627027"/>
+            <a:ext cx="960231" cy="1427302"/>
           </a:xfrm>
           <a:prstGeom prst="straightConnector1">
             <a:avLst/>

</xml_diff>